<commit_message>
Upload for Class Presentation - fixed flowchart
</commit_message>
<xml_diff>
--- a/documentation/Presentation1.pptx
+++ b/documentation/Presentation1.pptx
@@ -4207,7 +4207,7 @@
         </p:nvSpPr>
         <p:spPr>
           <a:xfrm>
-            <a:off x="6077527" y="4938516"/>
+            <a:off x="6077527" y="4876800"/>
             <a:ext cx="990600" cy="769557"/>
           </a:xfrm>
           <a:prstGeom prst="flowChartProcess">
@@ -4771,7 +4771,11 @@
             <a:pPr algn="ctr"/>
             <a:r>
               <a:rPr lang="en-US" sz="1200" dirty="0" smtClean="0"/>
-              <a:t>Return: Successful Played</a:t>
+              <a:t>Return: </a:t>
+            </a:r>
+            <a:r>
+              <a:rPr lang="en-US" sz="1200" dirty="0" smtClean="0"/>
+              <a:t>Not Played</a:t>
             </a:r>
             <a:endParaRPr lang="en-US" sz="1200" dirty="0"/>
           </a:p>
@@ -5106,14 +5110,14 @@
           <p:cNvPr id="75" name="Straight Arrow Connector 74"/>
           <p:cNvCxnSpPr>
             <a:stCxn id="62" idx="0"/>
-            <a:endCxn id="5" idx="4"/>
+            <a:endCxn id="37" idx="6"/>
           </p:cNvCxnSpPr>
           <p:nvPr/>
         </p:nvCxnSpPr>
         <p:spPr>
           <a:xfrm flipH="1" flipV="1">
-            <a:off x="571500" y="2046695"/>
-            <a:ext cx="1761259" cy="2895600"/>
+            <a:off x="1066800" y="2737007"/>
+            <a:ext cx="1265959" cy="2205288"/>
           </a:xfrm>
           <a:prstGeom prst="straightConnector1">
             <a:avLst/>
@@ -5162,6 +5166,370 @@
             <a:r>
               <a:rPr lang="en-US" dirty="0" smtClean="0"/>
               <a:t>Human Play (DOM Card Element Event Listener)</a:t>
+            </a:r>
+            <a:endParaRPr lang="en-US" dirty="0"/>
+          </a:p>
+        </p:txBody>
+      </p:sp>
+      <p:sp>
+        <p:nvSpPr>
+          <p:cNvPr id="37" name="Flowchart: Connector 36"/>
+          <p:cNvSpPr/>
+          <p:nvPr/>
+        </p:nvSpPr>
+        <p:spPr>
+          <a:xfrm>
+            <a:off x="76200" y="2241707"/>
+            <a:ext cx="990600" cy="990600"/>
+          </a:xfrm>
+          <a:prstGeom prst="flowChartConnector">
+            <a:avLst/>
+          </a:prstGeom>
+        </p:spPr>
+        <p:style>
+          <a:lnRef idx="2">
+            <a:schemeClr val="accent1">
+              <a:shade val="50000"/>
+            </a:schemeClr>
+          </a:lnRef>
+          <a:fillRef idx="1">
+            <a:schemeClr val="accent1"/>
+          </a:fillRef>
+          <a:effectRef idx="0">
+            <a:schemeClr val="accent1"/>
+          </a:effectRef>
+          <a:fontRef idx="minor">
+            <a:schemeClr val="lt1"/>
+          </a:fontRef>
+        </p:style>
+        <p:txBody>
+          <a:bodyPr rtlCol="0" anchor="ctr"/>
+          <a:lstStyle/>
+          <a:p>
+            <a:pPr algn="ctr"/>
+            <a:r>
+              <a:rPr lang="en-US" sz="1200" dirty="0" smtClean="0"/>
+              <a:t>End</a:t>
+            </a:r>
+            <a:endParaRPr lang="en-US" sz="1200" dirty="0"/>
+          </a:p>
+        </p:txBody>
+      </p:sp>
+      <p:cxnSp>
+        <p:nvCxnSpPr>
+          <p:cNvPr id="40" name="Straight Arrow Connector 39"/>
+          <p:cNvCxnSpPr>
+            <a:stCxn id="70" idx="0"/>
+            <a:endCxn id="37" idx="4"/>
+          </p:cNvCxnSpPr>
+          <p:nvPr/>
+        </p:nvCxnSpPr>
+        <p:spPr>
+          <a:xfrm flipH="1" flipV="1">
+            <a:off x="571500" y="3232307"/>
+            <a:ext cx="76200" cy="300495"/>
+          </a:xfrm>
+          <a:prstGeom prst="straightConnector1">
+            <a:avLst/>
+          </a:prstGeom>
+          <a:ln>
+            <a:tailEnd type="arrow"/>
+          </a:ln>
+        </p:spPr>
+        <p:style>
+          <a:lnRef idx="1">
+            <a:schemeClr val="accent1"/>
+          </a:lnRef>
+          <a:fillRef idx="0">
+            <a:schemeClr val="accent1"/>
+          </a:fillRef>
+          <a:effectRef idx="0">
+            <a:schemeClr val="accent1"/>
+          </a:effectRef>
+          <a:fontRef idx="minor">
+            <a:schemeClr val="tx1"/>
+          </a:fontRef>
+        </p:style>
+      </p:cxnSp>
+      <p:sp>
+        <p:nvSpPr>
+          <p:cNvPr id="22" name="TextBox 21"/>
+          <p:cNvSpPr txBox="1"/>
+          <p:nvPr/>
+        </p:nvSpPr>
+        <p:spPr>
+          <a:xfrm>
+            <a:off x="2514600" y="1132294"/>
+            <a:ext cx="296876" cy="369332"/>
+          </a:xfrm>
+          <a:prstGeom prst="rect">
+            <a:avLst/>
+          </a:prstGeom>
+          <a:noFill/>
+        </p:spPr>
+        <p:txBody>
+          <a:bodyPr wrap="none" rtlCol="0">
+            <a:spAutoFit/>
+          </a:bodyPr>
+          <a:lstStyle/>
+          <a:p>
+            <a:r>
+              <a:rPr lang="en-US" dirty="0" smtClean="0"/>
+              <a:t>Y</a:t>
+            </a:r>
+            <a:endParaRPr lang="en-US" dirty="0"/>
+          </a:p>
+        </p:txBody>
+      </p:sp>
+      <p:sp>
+        <p:nvSpPr>
+          <p:cNvPr id="44" name="TextBox 43"/>
+          <p:cNvSpPr txBox="1"/>
+          <p:nvPr/>
+        </p:nvSpPr>
+        <p:spPr>
+          <a:xfrm>
+            <a:off x="6637324" y="1154668"/>
+            <a:ext cx="296876" cy="369332"/>
+          </a:xfrm>
+          <a:prstGeom prst="rect">
+            <a:avLst/>
+          </a:prstGeom>
+          <a:noFill/>
+        </p:spPr>
+        <p:txBody>
+          <a:bodyPr wrap="none" rtlCol="0">
+            <a:spAutoFit/>
+          </a:bodyPr>
+          <a:lstStyle/>
+          <a:p>
+            <a:r>
+              <a:rPr lang="en-US" dirty="0" smtClean="0"/>
+              <a:t>Y</a:t>
+            </a:r>
+            <a:endParaRPr lang="en-US" dirty="0"/>
+          </a:p>
+        </p:txBody>
+      </p:sp>
+      <p:sp>
+        <p:nvSpPr>
+          <p:cNvPr id="45" name="TextBox 44"/>
+          <p:cNvSpPr txBox="1"/>
+          <p:nvPr/>
+        </p:nvSpPr>
+        <p:spPr>
+          <a:xfrm>
+            <a:off x="4845547" y="2129821"/>
+            <a:ext cx="333746" cy="369332"/>
+          </a:xfrm>
+          <a:prstGeom prst="rect">
+            <a:avLst/>
+          </a:prstGeom>
+          <a:noFill/>
+        </p:spPr>
+        <p:txBody>
+          <a:bodyPr wrap="none" rtlCol="0">
+            <a:spAutoFit/>
+          </a:bodyPr>
+          <a:lstStyle/>
+          <a:p>
+            <a:r>
+              <a:rPr lang="en-US" dirty="0" smtClean="0"/>
+              <a:t>N</a:t>
+            </a:r>
+            <a:endParaRPr lang="en-US" dirty="0"/>
+          </a:p>
+        </p:txBody>
+      </p:sp>
+      <p:sp>
+        <p:nvSpPr>
+          <p:cNvPr id="47" name="TextBox 46"/>
+          <p:cNvSpPr txBox="1"/>
+          <p:nvPr/>
+        </p:nvSpPr>
+        <p:spPr>
+          <a:xfrm>
+            <a:off x="7102107" y="2499153"/>
+            <a:ext cx="296876" cy="369332"/>
+          </a:xfrm>
+          <a:prstGeom prst="rect">
+            <a:avLst/>
+          </a:prstGeom>
+          <a:noFill/>
+        </p:spPr>
+        <p:txBody>
+          <a:bodyPr wrap="none" rtlCol="0">
+            <a:spAutoFit/>
+          </a:bodyPr>
+          <a:lstStyle/>
+          <a:p>
+            <a:r>
+              <a:rPr lang="en-US" dirty="0" smtClean="0"/>
+              <a:t>Y</a:t>
+            </a:r>
+            <a:endParaRPr lang="en-US" dirty="0"/>
+          </a:p>
+        </p:txBody>
+      </p:sp>
+      <p:sp>
+        <p:nvSpPr>
+          <p:cNvPr id="50" name="TextBox 49"/>
+          <p:cNvSpPr txBox="1"/>
+          <p:nvPr/>
+        </p:nvSpPr>
+        <p:spPr>
+          <a:xfrm>
+            <a:off x="8153400" y="3498806"/>
+            <a:ext cx="333746" cy="369332"/>
+          </a:xfrm>
+          <a:prstGeom prst="rect">
+            <a:avLst/>
+          </a:prstGeom>
+          <a:noFill/>
+        </p:spPr>
+        <p:txBody>
+          <a:bodyPr wrap="none" rtlCol="0">
+            <a:spAutoFit/>
+          </a:bodyPr>
+          <a:lstStyle/>
+          <a:p>
+            <a:r>
+              <a:rPr lang="en-US" dirty="0" smtClean="0"/>
+              <a:t>N</a:t>
+            </a:r>
+            <a:endParaRPr lang="en-US" dirty="0"/>
+          </a:p>
+        </p:txBody>
+      </p:sp>
+      <p:sp>
+        <p:nvSpPr>
+          <p:cNvPr id="51" name="TextBox 50"/>
+          <p:cNvSpPr txBox="1"/>
+          <p:nvPr/>
+        </p:nvSpPr>
+        <p:spPr>
+          <a:xfrm>
+            <a:off x="7079016" y="3928180"/>
+            <a:ext cx="296876" cy="369332"/>
+          </a:xfrm>
+          <a:prstGeom prst="rect">
+            <a:avLst/>
+          </a:prstGeom>
+          <a:noFill/>
+        </p:spPr>
+        <p:txBody>
+          <a:bodyPr wrap="none" rtlCol="0">
+            <a:spAutoFit/>
+          </a:bodyPr>
+          <a:lstStyle/>
+          <a:p>
+            <a:r>
+              <a:rPr lang="en-US" dirty="0" smtClean="0"/>
+              <a:t>Y</a:t>
+            </a:r>
+            <a:endParaRPr lang="en-US" dirty="0"/>
+          </a:p>
+        </p:txBody>
+      </p:sp>
+      <p:sp>
+        <p:nvSpPr>
+          <p:cNvPr id="53" name="Flowchart: Connector 52"/>
+          <p:cNvSpPr/>
+          <p:nvPr/>
+        </p:nvSpPr>
+        <p:spPr>
+          <a:xfrm>
+            <a:off x="6237692" y="5715000"/>
+            <a:ext cx="620308" cy="620308"/>
+          </a:xfrm>
+          <a:prstGeom prst="flowChartConnector">
+            <a:avLst/>
+          </a:prstGeom>
+        </p:spPr>
+        <p:style>
+          <a:lnRef idx="2">
+            <a:schemeClr val="accent1">
+              <a:shade val="50000"/>
+            </a:schemeClr>
+          </a:lnRef>
+          <a:fillRef idx="1">
+            <a:schemeClr val="accent1"/>
+          </a:fillRef>
+          <a:effectRef idx="0">
+            <a:schemeClr val="accent1"/>
+          </a:effectRef>
+          <a:fontRef idx="minor">
+            <a:schemeClr val="lt1"/>
+          </a:fontRef>
+        </p:style>
+        <p:txBody>
+          <a:bodyPr rtlCol="0" anchor="ctr"/>
+          <a:lstStyle/>
+          <a:p>
+            <a:pPr algn="ctr"/>
+            <a:r>
+              <a:rPr lang="en-US" sz="1200" dirty="0" smtClean="0"/>
+              <a:t>End</a:t>
+            </a:r>
+            <a:endParaRPr lang="en-US" sz="1200" dirty="0"/>
+          </a:p>
+        </p:txBody>
+      </p:sp>
+      <p:sp>
+        <p:nvSpPr>
+          <p:cNvPr id="54" name="TextBox 53"/>
+          <p:cNvSpPr txBox="1"/>
+          <p:nvPr/>
+        </p:nvSpPr>
+        <p:spPr>
+          <a:xfrm>
+            <a:off x="918362" y="6364393"/>
+            <a:ext cx="296876" cy="369332"/>
+          </a:xfrm>
+          <a:prstGeom prst="rect">
+            <a:avLst/>
+          </a:prstGeom>
+          <a:noFill/>
+        </p:spPr>
+        <p:txBody>
+          <a:bodyPr wrap="none" rtlCol="0">
+            <a:spAutoFit/>
+          </a:bodyPr>
+          <a:lstStyle/>
+          <a:p>
+            <a:r>
+              <a:rPr lang="en-US" dirty="0" smtClean="0"/>
+              <a:t>Y</a:t>
+            </a:r>
+            <a:endParaRPr lang="en-US" dirty="0"/>
+          </a:p>
+        </p:txBody>
+      </p:sp>
+      <p:sp>
+        <p:nvSpPr>
+          <p:cNvPr id="55" name="TextBox 54"/>
+          <p:cNvSpPr txBox="1"/>
+          <p:nvPr/>
+        </p:nvSpPr>
+        <p:spPr>
+          <a:xfrm>
+            <a:off x="1953089" y="3860862"/>
+            <a:ext cx="333746" cy="369332"/>
+          </a:xfrm>
+          <a:prstGeom prst="rect">
+            <a:avLst/>
+          </a:prstGeom>
+          <a:noFill/>
+        </p:spPr>
+        <p:txBody>
+          <a:bodyPr wrap="none" rtlCol="0">
+            <a:spAutoFit/>
+          </a:bodyPr>
+          <a:lstStyle/>
+          <a:p>
+            <a:r>
+              <a:rPr lang="en-US" dirty="0" smtClean="0"/>
+              <a:t>N</a:t>
             </a:r>
             <a:endParaRPr lang="en-US" dirty="0"/>
           </a:p>

</xml_diff>